<commit_message>
[UPDATE] Fixed issue with multiple upload.
</commit_message>
<xml_diff>
--- a/Input2.pptx
+++ b/Input2.pptx
@@ -1,6 +1,6 @@
 
 <file path=ppt/presentation.xml><?xml version="1.0" encoding="utf-8"?>
-<p:presentation xmlns:a="http://schemas.openxmlformats.org/drawingml/2006/main" xmlns:r="http://schemas.openxmlformats.org/officeDocument/2006/relationships" xmlns:p="http://schemas.openxmlformats.org/presentationml/2006/main" strictFirstAndLastChars="0" autoCompressPictures="0">
+<p:presentation xmlns:a="http://schemas.openxmlformats.org/drawingml/2006/main" xmlns:r="http://schemas.openxmlformats.org/officeDocument/2006/relationships" xmlns:p="http://schemas.openxmlformats.org/presentationml/2006/main" strictFirstAndLastChars="0" embedTrueTypeFonts="1" saveSubsetFonts="1" autoCompressPictures="0">
   <p:sldMasterIdLst>
     <p:sldMasterId id="2147483648" r:id="rId1"/>
   </p:sldMasterIdLst>
@@ -13,6 +13,15 @@
   </p:sldIdLst>
   <p:sldSz cx="9144000" cy="5143500"/>
   <p:notesSz cx="6858000" cy="9144000"/>
+  <p:embeddedFontLst>
+    <p:embeddedFont>
+      <p:font typeface="Roboto" charset="0"/>
+      <p:regular r:id="rId9"/>
+      <p:bold r:id="rId10"/>
+      <p:italic r:id="rId11"/>
+      <p:boldItalic r:id="rId12"/>
+    </p:embeddedFont>
+  </p:embeddedFontLst>
   <p:defaultTextStyle>
     <a:defPPr marR="0" lvl="0" algn="l" rtl="0">
       <a:lnSpc>
@@ -699,106 +708,7 @@
       </p:grpSpPr>
       <p:sp>
         <p:nvSpPr>
-          <p:cNvPr id="51" name="Google Shape;51;p:notes"/>
-          <p:cNvSpPr/>
-          <p:nvPr>
-            <p:ph type="sldImg" idx="2"/>
-          </p:nvPr>
-        </p:nvSpPr>
-        <p:spPr>
-          <a:xfrm>
-            <a:off x="381300" y="685800"/>
-            <a:ext cx="6096075" cy="3429000"/>
-          </a:xfrm>
-          <a:custGeom>
-            <a:avLst/>
-            <a:gdLst/>
-            <a:ahLst/>
-            <a:cxnLst/>
-            <a:rect l="l" t="t" r="r" b="b"/>
-            <a:pathLst>
-              <a:path w="120000" h="120000" extrusionOk="0">
-                <a:moveTo>
-                  <a:pt x="0" y="0"/>
-                </a:moveTo>
-                <a:lnTo>
-                  <a:pt x="120000" y="0"/>
-                </a:lnTo>
-                <a:lnTo>
-                  <a:pt x="120000" y="120000"/>
-                </a:lnTo>
-                <a:lnTo>
-                  <a:pt x="0" y="120000"/>
-                </a:lnTo>
-                <a:close/>
-              </a:path>
-            </a:pathLst>
-          </a:custGeom>
-        </p:spPr>
-      </p:sp>
-      <p:sp>
-        <p:nvSpPr>
-          <p:cNvPr id="52" name="Google Shape;52;p:notes"/>
-          <p:cNvSpPr txBox="1"/>
-          <p:nvPr>
-            <p:ph type="body" idx="1"/>
-          </p:nvPr>
-        </p:nvSpPr>
-        <p:spPr>
-          <a:xfrm>
-            <a:off x="685800" y="4343400"/>
-            <a:ext cx="5486400" cy="4114800"/>
-          </a:xfrm>
-          <a:prstGeom prst="rect">
-            <a:avLst/>
-          </a:prstGeom>
-        </p:spPr>
-        <p:txBody>
-          <a:bodyPr spcFirstLastPara="1" wrap="square" lIns="91425" tIns="91425" rIns="91425" bIns="91425" anchor="t" anchorCtr="0">
-            <a:noAutofit/>
-          </a:bodyPr>
-          <a:lstStyle/>
-          <a:p>
-            <a:pPr marL="0" lvl="0" indent="0" algn="l" rtl="0">
-              <a:spcBef>
-                <a:spcPts val="0"/>
-              </a:spcBef>
-              <a:spcAft>
-                <a:spcPts val="0"/>
-              </a:spcAft>
-              <a:buNone/>
-            </a:pPr>
-          </a:p>
-        </p:txBody>
-      </p:sp>
-    </p:spTree>
-  </p:cSld>
-  <p:clrMapOvr>
-    <a:masterClrMapping/>
-  </p:clrMapOvr>
-</p:notes>
-</file>
-
-<file path=ppt/notesSlides/notesSlide2.xml><?xml version="1.0" encoding="utf-8"?>
-<p:notes xmlns:a="http://schemas.openxmlformats.org/drawingml/2006/main" xmlns:r="http://schemas.openxmlformats.org/officeDocument/2006/relationships" xmlns:p="http://schemas.openxmlformats.org/presentationml/2006/main" showMasterPhAnim="0" showMasterSp="0">
-  <p:cSld>
-    <p:spTree>
-      <p:nvGrpSpPr>
-        <p:cNvPr id="56" name="Shape 56"/>
-        <p:cNvGrpSpPr/>
-        <p:nvPr/>
-      </p:nvGrpSpPr>
-      <p:grpSpPr>
-        <a:xfrm>
-          <a:off x="0" y="0"/>
-          <a:ext cx="0" cy="0"/>
-          <a:chOff x="0" y="0"/>
-          <a:chExt cx="0" cy="0"/>
-        </a:xfrm>
-      </p:grpSpPr>
-      <p:sp>
-        <p:nvSpPr>
-          <p:cNvPr id="57" name="Google Shape;57;gec57cf53f3_3_0:notes"/>
+          <p:cNvPr id="51" name="Google Shape;51;gf859c67b9e_0_62:notes"/>
           <p:cNvSpPr/>
           <p:nvPr>
             <p:ph type="sldImg" idx="2"/>
@@ -837,7 +747,106 @@
       </p:sp>
       <p:sp>
         <p:nvSpPr>
-          <p:cNvPr id="58" name="Google Shape;58;gec57cf53f3_3_0:notes"/>
+          <p:cNvPr id="52" name="Google Shape;52;gf859c67b9e_0_62:notes"/>
+          <p:cNvSpPr txBox="1"/>
+          <p:nvPr>
+            <p:ph type="body" idx="1"/>
+          </p:nvPr>
+        </p:nvSpPr>
+        <p:spPr>
+          <a:xfrm>
+            <a:off x="685800" y="4343400"/>
+            <a:ext cx="5486400" cy="4114800"/>
+          </a:xfrm>
+          <a:prstGeom prst="rect">
+            <a:avLst/>
+          </a:prstGeom>
+        </p:spPr>
+        <p:txBody>
+          <a:bodyPr spcFirstLastPara="1" wrap="square" lIns="91425" tIns="91425" rIns="91425" bIns="91425" anchor="t" anchorCtr="0">
+            <a:noAutofit/>
+          </a:bodyPr>
+          <a:lstStyle/>
+          <a:p>
+            <a:pPr marL="0" lvl="0" indent="0" algn="l" rtl="0">
+              <a:spcBef>
+                <a:spcPts val="0"/>
+              </a:spcBef>
+              <a:spcAft>
+                <a:spcPts val="0"/>
+              </a:spcAft>
+              <a:buNone/>
+            </a:pPr>
+          </a:p>
+        </p:txBody>
+      </p:sp>
+    </p:spTree>
+  </p:cSld>
+  <p:clrMapOvr>
+    <a:masterClrMapping/>
+  </p:clrMapOvr>
+</p:notes>
+</file>
+
+<file path=ppt/notesSlides/notesSlide2.xml><?xml version="1.0" encoding="utf-8"?>
+<p:notes xmlns:a="http://schemas.openxmlformats.org/drawingml/2006/main" xmlns:r="http://schemas.openxmlformats.org/officeDocument/2006/relationships" xmlns:p="http://schemas.openxmlformats.org/presentationml/2006/main" showMasterPhAnim="0" showMasterSp="0">
+  <p:cSld>
+    <p:spTree>
+      <p:nvGrpSpPr>
+        <p:cNvPr id="56" name="Shape 56"/>
+        <p:cNvGrpSpPr/>
+        <p:nvPr/>
+      </p:nvGrpSpPr>
+      <p:grpSpPr>
+        <a:xfrm>
+          <a:off x="0" y="0"/>
+          <a:ext cx="0" cy="0"/>
+          <a:chOff x="0" y="0"/>
+          <a:chExt cx="0" cy="0"/>
+        </a:xfrm>
+      </p:grpSpPr>
+      <p:sp>
+        <p:nvSpPr>
+          <p:cNvPr id="57" name="Google Shape;57;gfcaeca1561_0_45:notes"/>
+          <p:cNvSpPr/>
+          <p:nvPr>
+            <p:ph type="sldImg" idx="2"/>
+          </p:nvPr>
+        </p:nvSpPr>
+        <p:spPr>
+          <a:xfrm>
+            <a:off x="381300" y="685800"/>
+            <a:ext cx="6096000" cy="3429000"/>
+          </a:xfrm>
+          <a:custGeom>
+            <a:avLst/>
+            <a:gdLst/>
+            <a:ahLst/>
+            <a:cxnLst/>
+            <a:rect l="l" t="t" r="r" b="b"/>
+            <a:pathLst>
+              <a:path w="120000" h="120000" extrusionOk="0">
+                <a:moveTo>
+                  <a:pt x="0" y="0"/>
+                </a:moveTo>
+                <a:lnTo>
+                  <a:pt x="120000" y="0"/>
+                </a:lnTo>
+                <a:lnTo>
+                  <a:pt x="120000" y="120000"/>
+                </a:lnTo>
+                <a:lnTo>
+                  <a:pt x="0" y="120000"/>
+                </a:lnTo>
+                <a:close/>
+              </a:path>
+            </a:pathLst>
+          </a:custGeom>
+        </p:spPr>
+      </p:sp>
+      <p:sp>
+        <p:nvSpPr>
+          <p:cNvPr id="58" name="Google Shape;58;gfcaeca1561_0_45:notes"/>
           <p:cNvSpPr txBox="1"/>
           <p:nvPr>
             <p:ph type="body" idx="1"/>
@@ -5534,13 +5543,13 @@
           <p:cNvPr id="54" name="Google Shape;54;p13"/>
           <p:cNvSpPr txBox="1"/>
           <p:nvPr>
-            <p:ph type="subTitle" idx="1"/>
+            <p:ph type="title"/>
           </p:nvPr>
         </p:nvSpPr>
         <p:spPr>
           <a:xfrm>
-            <a:off x="173550" y="0"/>
-            <a:ext cx="8520600" cy="792600"/>
+            <a:off x="311700" y="445025"/>
+            <a:ext cx="8520600" cy="572700"/>
           </a:xfrm>
           <a:prstGeom prst="rect">
             <a:avLst/>
@@ -5548,533 +5557,158 @@
         </p:spPr>
         <p:txBody>
           <a:bodyPr spcFirstLastPara="1" wrap="square" lIns="91425" tIns="91425" rIns="91425" bIns="91425" anchor="t" anchorCtr="0">
-            <a:noAutofit/>
+            <a:normAutofit fontScale="90000"/>
           </a:bodyPr>
           <a:lstStyle/>
           <a:p>
-            <a:pPr marL="0" lvl="0" indent="0" algn="ctr" rtl="0">
-              <a:lnSpc>
-                <a:spcPct val="80000"/>
-              </a:lnSpc>
-              <a:spcBef>
-                <a:spcPts val="1200"/>
-              </a:spcBef>
-              <a:spcAft>
-                <a:spcPts val="0"/>
-              </a:spcAft>
-              <a:buClr>
-                <a:schemeClr val="dk1"/>
-              </a:buClr>
-              <a:buSzPts val="275"/>
-              <a:buFont typeface="Arial" panose="020B0704020202020204"/>
+            <a:pPr marL="0" lvl="0" indent="0" algn="l" rtl="0">
+              <a:spcBef>
+                <a:spcPts val="0"/>
+              </a:spcBef>
+              <a:spcAft>
+                <a:spcPts val="0"/>
+              </a:spcAft>
               <a:buNone/>
             </a:pPr>
             <a:r>
-              <a:rPr lang="en-GB" sz="1050" b="1">
-                <a:solidFill>
-                  <a:schemeClr val="dk1"/>
-                </a:solidFill>
-              </a:rPr>
-              <a:t>MAJOR PROJECT REPORT</a:t>
+              <a:rPr lang="en-GB"/>
+              <a:t>APNA.CO</a:t>
             </a:r>
-            <a:endParaRPr sz="1050" b="1">
-              <a:solidFill>
-                <a:schemeClr val="dk1"/>
-              </a:solidFill>
-            </a:endParaRPr>
-          </a:p>
-          <a:p>
-            <a:pPr marL="0" lvl="0" indent="0" algn="ctr" rtl="0">
-              <a:lnSpc>
-                <a:spcPct val="80000"/>
-              </a:lnSpc>
-              <a:spcBef>
-                <a:spcPts val="1200"/>
-              </a:spcBef>
-              <a:spcAft>
-                <a:spcPts val="0"/>
-              </a:spcAft>
-              <a:buClr>
-                <a:schemeClr val="dk1"/>
-              </a:buClr>
-              <a:buSzPts val="275"/>
-              <a:buFont typeface="Arial" panose="020B0704020202020204"/>
-              <a:buNone/>
-            </a:pPr>
-            <a:r>
-              <a:rPr lang="en-GB" sz="1050">
-                <a:solidFill>
-                  <a:schemeClr val="dk1"/>
-                </a:solidFill>
-              </a:rPr>
-              <a:t>ON</a:t>
-            </a:r>
-            <a:endParaRPr sz="1050">
-              <a:solidFill>
-                <a:schemeClr val="dk1"/>
-              </a:solidFill>
-            </a:endParaRPr>
-          </a:p>
-          <a:p>
-            <a:pPr marL="0" lvl="0" indent="0" algn="ctr" rtl="0">
-              <a:lnSpc>
-                <a:spcPct val="80000"/>
-              </a:lnSpc>
-              <a:spcBef>
-                <a:spcPts val="1200"/>
-              </a:spcBef>
-              <a:spcAft>
-                <a:spcPts val="0"/>
-              </a:spcAft>
-              <a:buClr>
-                <a:schemeClr val="dk1"/>
-              </a:buClr>
-              <a:buSzPts val="275"/>
-              <a:buFont typeface="Arial" panose="020B0704020202020204"/>
-              <a:buNone/>
-            </a:pPr>
-            <a:r>
-              <a:rPr lang="en-GB" sz="1750" b="1">
-                <a:solidFill>
-                  <a:schemeClr val="dk1"/>
-                </a:solidFill>
-              </a:rPr>
-              <a:t>Blog Website </a:t>
-            </a:r>
-            <a:endParaRPr sz="1750" b="1">
-              <a:solidFill>
-                <a:schemeClr val="dk1"/>
-              </a:solidFill>
-            </a:endParaRPr>
-          </a:p>
-          <a:p>
-            <a:pPr marL="0" lvl="0" indent="0" algn="ctr" rtl="0">
-              <a:lnSpc>
-                <a:spcPct val="80000"/>
-              </a:lnSpc>
-              <a:spcBef>
-                <a:spcPts val="1200"/>
-              </a:spcBef>
-              <a:spcAft>
-                <a:spcPts val="0"/>
-              </a:spcAft>
-              <a:buClr>
-                <a:schemeClr val="dk1"/>
-              </a:buClr>
-              <a:buSzPts val="275"/>
-              <a:buFont typeface="Arial" panose="020B0704020202020204"/>
-              <a:buNone/>
-            </a:pPr>
-            <a:r>
-              <a:rPr lang="en-GB" sz="1750" b="1">
-                <a:solidFill>
-                  <a:schemeClr val="dk1"/>
-                </a:solidFill>
-              </a:rPr>
-              <a:t>Using Django</a:t>
-            </a:r>
-            <a:r>
-              <a:rPr lang="en-GB" sz="1675" b="1">
-                <a:solidFill>
-                  <a:schemeClr val="dk1"/>
-                </a:solidFill>
-              </a:rPr>
-              <a:t> </a:t>
-            </a:r>
-            <a:r>
-              <a:rPr lang="en-GB" sz="1750" b="1">
-                <a:solidFill>
-                  <a:schemeClr val="dk1"/>
-                </a:solidFill>
-              </a:rPr>
-              <a:t>RESTful Api and React</a:t>
-            </a:r>
-            <a:endParaRPr sz="1750" b="1">
-              <a:solidFill>
-                <a:schemeClr val="dk1"/>
-              </a:solidFill>
-            </a:endParaRPr>
-          </a:p>
-          <a:p>
-            <a:pPr marL="0" lvl="0" indent="0" algn="ctr" rtl="0">
-              <a:lnSpc>
-                <a:spcPct val="80000"/>
-              </a:lnSpc>
-              <a:spcBef>
-                <a:spcPts val="1200"/>
-              </a:spcBef>
-              <a:spcAft>
-                <a:spcPts val="0"/>
-              </a:spcAft>
-              <a:buClr>
-                <a:schemeClr val="dk1"/>
-              </a:buClr>
-              <a:buSzPts val="275"/>
-              <a:buFont typeface="Arial" panose="020B0704020202020204"/>
-              <a:buNone/>
-            </a:pPr>
-            <a:r>
-              <a:rPr lang="en-GB" sz="1050">
-                <a:solidFill>
-                  <a:schemeClr val="dk1"/>
-                </a:solidFill>
-              </a:rPr>
-              <a:t>SUBMITTED IN PARTIAL FULFILLMENT OF THE DEGREE OF</a:t>
-            </a:r>
-            <a:endParaRPr sz="1050">
-              <a:solidFill>
-                <a:schemeClr val="dk1"/>
-              </a:solidFill>
-            </a:endParaRPr>
-          </a:p>
-          <a:p>
-            <a:pPr marL="0" lvl="0" indent="0" algn="ctr" rtl="0">
-              <a:lnSpc>
-                <a:spcPct val="80000"/>
-              </a:lnSpc>
-              <a:spcBef>
-                <a:spcPts val="1200"/>
-              </a:spcBef>
-              <a:spcAft>
-                <a:spcPts val="0"/>
-              </a:spcAft>
-              <a:buClr>
-                <a:schemeClr val="dk1"/>
-              </a:buClr>
-              <a:buSzPts val="275"/>
-              <a:buFont typeface="Arial" panose="020B0704020202020204"/>
-              <a:buNone/>
-            </a:pPr>
-            <a:r>
-              <a:rPr lang="en-GB" sz="1050">
-                <a:solidFill>
-                  <a:schemeClr val="dk1"/>
-                </a:solidFill>
-              </a:rPr>
-              <a:t>BACHELOR OF TECHNOLOGY</a:t>
-            </a:r>
-            <a:endParaRPr sz="1050">
-              <a:solidFill>
-                <a:schemeClr val="dk1"/>
-              </a:solidFill>
-            </a:endParaRPr>
-          </a:p>
-          <a:p>
-            <a:pPr marL="0" lvl="0" indent="0" algn="ctr" rtl="0">
-              <a:lnSpc>
-                <a:spcPct val="80000"/>
-              </a:lnSpc>
-              <a:spcBef>
-                <a:spcPts val="1200"/>
-              </a:spcBef>
-              <a:spcAft>
-                <a:spcPts val="0"/>
-              </a:spcAft>
-              <a:buClr>
-                <a:schemeClr val="dk1"/>
-              </a:buClr>
-              <a:buSzPts val="275"/>
-              <a:buFont typeface="Arial" panose="020B0704020202020204"/>
-              <a:buNone/>
-            </a:pPr>
-            <a:endParaRPr sz="1050">
-              <a:solidFill>
-                <a:schemeClr val="dk1"/>
-              </a:solidFill>
-            </a:endParaRPr>
-          </a:p>
-          <a:p>
-            <a:pPr marL="0" lvl="0" indent="0" algn="ctr" rtl="0">
-              <a:lnSpc>
-                <a:spcPct val="80000"/>
-              </a:lnSpc>
-              <a:spcBef>
-                <a:spcPts val="1200"/>
-              </a:spcBef>
-              <a:spcAft>
-                <a:spcPts val="0"/>
-              </a:spcAft>
-              <a:buClr>
-                <a:schemeClr val="dk1"/>
-              </a:buClr>
-              <a:buSzPts val="275"/>
-              <a:buFont typeface="Arial" panose="020B0704020202020204"/>
-              <a:buNone/>
-            </a:pPr>
-            <a:r>
-              <a:rPr lang="en-GB" sz="1050" b="1">
-                <a:solidFill>
-                  <a:schemeClr val="dk1"/>
-                </a:solidFill>
-              </a:rPr>
-              <a:t>NAVAL PANGTEY (170180101031)</a:t>
-            </a:r>
-            <a:endParaRPr sz="1050" b="1">
-              <a:solidFill>
-                <a:schemeClr val="dk1"/>
-              </a:solidFill>
-            </a:endParaRPr>
-          </a:p>
-          <a:p>
-            <a:pPr marL="0" lvl="0" indent="0" algn="ctr" rtl="0">
-              <a:lnSpc>
-                <a:spcPct val="80000"/>
-              </a:lnSpc>
-              <a:spcBef>
-                <a:spcPts val="1200"/>
-              </a:spcBef>
-              <a:spcAft>
-                <a:spcPts val="0"/>
-              </a:spcAft>
-              <a:buClr>
-                <a:schemeClr val="dk1"/>
-              </a:buClr>
-              <a:buSzPts val="275"/>
-              <a:buFont typeface="Arial" panose="020B0704020202020204"/>
-              <a:buNone/>
-            </a:pPr>
-            <a:r>
-              <a:rPr lang="en-GB" sz="1050" b="1">
-                <a:solidFill>
-                  <a:schemeClr val="dk1"/>
-                </a:solidFill>
-              </a:rPr>
-              <a:t>KABIR PATHAK (170180101024)</a:t>
-            </a:r>
-            <a:endParaRPr sz="1050" b="1">
-              <a:solidFill>
-                <a:schemeClr val="dk1"/>
-              </a:solidFill>
-            </a:endParaRPr>
-          </a:p>
-          <a:p>
-            <a:pPr marL="0" lvl="0" indent="0" algn="ctr" rtl="0">
-              <a:lnSpc>
-                <a:spcPct val="80000"/>
-              </a:lnSpc>
-              <a:spcBef>
-                <a:spcPts val="1200"/>
-              </a:spcBef>
-              <a:spcAft>
-                <a:spcPts val="0"/>
-              </a:spcAft>
-              <a:buClr>
-                <a:schemeClr val="dk1"/>
-              </a:buClr>
-              <a:buSzPts val="275"/>
-              <a:buFont typeface="Arial" panose="020B0704020202020204"/>
-              <a:buNone/>
-            </a:pPr>
-            <a:endParaRPr sz="1050" b="1">
-              <a:solidFill>
-                <a:schemeClr val="dk1"/>
-              </a:solidFill>
-            </a:endParaRPr>
-          </a:p>
-          <a:p>
-            <a:pPr marL="0" lvl="0" indent="0" algn="ctr" rtl="0">
-              <a:lnSpc>
-                <a:spcPct val="80000"/>
-              </a:lnSpc>
-              <a:spcBef>
-                <a:spcPts val="1200"/>
-              </a:spcBef>
-              <a:spcAft>
-                <a:spcPts val="0"/>
-              </a:spcAft>
-              <a:buClr>
-                <a:schemeClr val="dk1"/>
-              </a:buClr>
-              <a:buSzPts val="275"/>
-              <a:buFont typeface="Arial" panose="020B0704020202020204"/>
-              <a:buNone/>
-            </a:pPr>
-            <a:r>
-              <a:rPr lang="en-GB" sz="1050">
-                <a:solidFill>
-                  <a:schemeClr val="dk1"/>
-                </a:solidFill>
-              </a:rPr>
-              <a:t>UNDER THE SUPERVISION OF</a:t>
-            </a:r>
-            <a:endParaRPr sz="1050">
-              <a:solidFill>
-                <a:schemeClr val="dk1"/>
-              </a:solidFill>
-            </a:endParaRPr>
-          </a:p>
-          <a:p>
-            <a:pPr marL="0" lvl="0" indent="0" algn="ctr" rtl="0">
-              <a:lnSpc>
-                <a:spcPct val="80000"/>
-              </a:lnSpc>
-              <a:spcBef>
-                <a:spcPts val="1200"/>
-              </a:spcBef>
-              <a:spcAft>
-                <a:spcPts val="0"/>
-              </a:spcAft>
-              <a:buClr>
-                <a:schemeClr val="dk1"/>
-              </a:buClr>
-              <a:buSzPts val="275"/>
-              <a:buFont typeface="Arial" panose="020B0704020202020204"/>
-              <a:buNone/>
-            </a:pPr>
-            <a:r>
-              <a:rPr lang="en-GB" sz="1050" b="1">
-                <a:solidFill>
-                  <a:schemeClr val="dk1"/>
-                </a:solidFill>
-              </a:rPr>
-              <a:t>MR. SAGAR MAL NITHARWAL</a:t>
-            </a:r>
-            <a:endParaRPr sz="1050" b="1">
-              <a:solidFill>
-                <a:schemeClr val="dk1"/>
-              </a:solidFill>
-            </a:endParaRPr>
-          </a:p>
-          <a:p>
-            <a:pPr marL="0" lvl="0" indent="0" algn="ctr" rtl="0">
-              <a:lnSpc>
-                <a:spcPct val="80000"/>
-              </a:lnSpc>
-              <a:spcBef>
-                <a:spcPts val="1200"/>
-              </a:spcBef>
-              <a:spcAft>
-                <a:spcPts val="0"/>
-              </a:spcAft>
-              <a:buClr>
-                <a:schemeClr val="dk1"/>
-              </a:buClr>
-              <a:buSzPts val="275"/>
-              <a:buFont typeface="Arial" panose="020B0704020202020204"/>
-              <a:buNone/>
-            </a:pPr>
-            <a:r>
-              <a:rPr lang="en-GB" sz="1050">
-                <a:solidFill>
-                  <a:schemeClr val="dk1"/>
-                </a:solidFill>
-              </a:rPr>
-              <a:t>Assistant Professor</a:t>
-            </a:r>
-            <a:endParaRPr sz="1050">
-              <a:solidFill>
-                <a:schemeClr val="dk1"/>
-              </a:solidFill>
-            </a:endParaRPr>
-          </a:p>
-          <a:p>
-            <a:pPr marL="0" lvl="0" indent="0" algn="ctr" rtl="0">
-              <a:lnSpc>
-                <a:spcPct val="80000"/>
-              </a:lnSpc>
-              <a:spcBef>
-                <a:spcPts val="1200"/>
-              </a:spcBef>
-              <a:spcAft>
-                <a:spcPts val="0"/>
-              </a:spcAft>
-              <a:buClr>
-                <a:schemeClr val="dk1"/>
-              </a:buClr>
-              <a:buSzPts val="275"/>
-              <a:buFont typeface="Arial" panose="020B0704020202020204"/>
-              <a:buNone/>
-            </a:pPr>
-            <a:r>
-              <a:rPr lang="en-GB" sz="1050">
-                <a:solidFill>
-                  <a:schemeClr val="dk1"/>
-                </a:solidFill>
-              </a:rPr>
-              <a:t>Department of Computer Science &amp; Engineering</a:t>
-            </a:r>
-            <a:endParaRPr sz="1050">
-              <a:solidFill>
-                <a:schemeClr val="dk1"/>
-              </a:solidFill>
-            </a:endParaRPr>
-          </a:p>
-          <a:p>
-            <a:pPr marL="0" lvl="0" indent="0" algn="ctr" rtl="0">
-              <a:lnSpc>
-                <a:spcPct val="80000"/>
-              </a:lnSpc>
-              <a:spcBef>
-                <a:spcPts val="1200"/>
-              </a:spcBef>
-              <a:spcAft>
-                <a:spcPts val="0"/>
-              </a:spcAft>
-              <a:buClr>
-                <a:schemeClr val="dk1"/>
-              </a:buClr>
-              <a:buSzPts val="275"/>
-              <a:buFont typeface="Arial" panose="020B0704020202020204"/>
-              <a:buNone/>
-            </a:pPr>
-            <a:r>
-              <a:rPr lang="en-GB" sz="1050">
-                <a:solidFill>
-                  <a:schemeClr val="dk1"/>
-                </a:solidFill>
-              </a:rPr>
-              <a:t>Bipin Tripathi Kumaon Institute of Technology, Dwarahat</a:t>
-            </a:r>
-            <a:endParaRPr sz="1050">
-              <a:solidFill>
-                <a:schemeClr val="dk1"/>
-              </a:solidFill>
-            </a:endParaRPr>
-          </a:p>
-          <a:p>
-            <a:pPr marL="0" lvl="0" indent="0" algn="ctr" rtl="0">
-              <a:lnSpc>
-                <a:spcPct val="80000"/>
-              </a:lnSpc>
-              <a:spcBef>
-                <a:spcPts val="1200"/>
-              </a:spcBef>
-              <a:spcAft>
-                <a:spcPts val="0"/>
-              </a:spcAft>
-              <a:buSzPts val="275"/>
-              <a:buNone/>
-            </a:pPr>
-            <a:endParaRPr sz="1400"/>
+            <a:endParaRPr lang="en-GB"/>
           </a:p>
         </p:txBody>
       </p:sp>
-      <p:pic>
-        <p:nvPicPr>
-          <p:cNvPr id="55" name="Google Shape;55;p13" descr="C:\Users\dell\Downloads\download.jpg"/>
-          <p:cNvPicPr preferRelativeResize="0"/>
-          <p:nvPr/>
-        </p:nvPicPr>
-        <p:blipFill>
-          <a:blip r:embed="rId1"/>
-          <a:stretch>
-            <a:fillRect/>
-          </a:stretch>
-        </p:blipFill>
+      <p:sp>
+        <p:nvSpPr>
+          <p:cNvPr id="55" name="Google Shape;55;p13"/>
+          <p:cNvSpPr txBox="1"/>
+          <p:nvPr>
+            <p:ph type="body" idx="1"/>
+          </p:nvPr>
+        </p:nvSpPr>
         <p:spPr>
           <a:xfrm>
-            <a:off x="7256900" y="382675"/>
-            <a:ext cx="1506700" cy="1464650"/>
+            <a:off x="311700" y="1152475"/>
+            <a:ext cx="8520600" cy="3416400"/>
           </a:xfrm>
           <a:prstGeom prst="rect">
             <a:avLst/>
           </a:prstGeom>
-          <a:noFill/>
-          <a:ln>
-            <a:noFill/>
-          </a:ln>
         </p:spPr>
-      </p:pic>
+        <p:txBody>
+          <a:bodyPr spcFirstLastPara="1" wrap="square" lIns="91425" tIns="91425" rIns="91425" bIns="91425" anchor="t" anchorCtr="0">
+            <a:normAutofit/>
+          </a:bodyPr>
+          <a:lstStyle/>
+          <a:p>
+            <a:pPr marL="457200" lvl="0" indent="-381000" algn="l" rtl="0">
+              <a:lnSpc>
+                <a:spcPct val="100000"/>
+              </a:lnSpc>
+              <a:spcBef>
+                <a:spcPts val="0"/>
+              </a:spcBef>
+              <a:spcAft>
+                <a:spcPts val="0"/>
+              </a:spcAft>
+              <a:buSzPts val="2400"/>
+              <a:buChar char="-"/>
+            </a:pPr>
+            <a:r>
+              <a:rPr lang="en-GB" sz="2400"/>
+              <a:t>LinkedIn for the blue-collar workers.</a:t>
+            </a:r>
+            <a:endParaRPr sz="2400"/>
+          </a:p>
+          <a:p>
+            <a:pPr marL="457200" lvl="0" indent="-381000" algn="l" rtl="0">
+              <a:lnSpc>
+                <a:spcPct val="100000"/>
+              </a:lnSpc>
+              <a:spcBef>
+                <a:spcPts val="0"/>
+              </a:spcBef>
+              <a:spcAft>
+                <a:spcPts val="0"/>
+              </a:spcAft>
+              <a:buSzPts val="2400"/>
+              <a:buChar char="-"/>
+            </a:pPr>
+            <a:r>
+              <a:rPr lang="en-GB" sz="2400"/>
+              <a:t>The youngest startup to enter the unicorn club.</a:t>
+            </a:r>
+            <a:br>
+              <a:rPr lang="en-GB" sz="2400"/>
+            </a:br>
+            <a:r>
+              <a:rPr lang="en-GB" sz="2400"/>
+              <a:t>(valuation &gt;= 1 Billion USD).</a:t>
+            </a:r>
+            <a:endParaRPr sz="2400"/>
+          </a:p>
+          <a:p>
+            <a:pPr marL="457200" lvl="0" indent="-381000" algn="l" rtl="0">
+              <a:lnSpc>
+                <a:spcPct val="100000"/>
+              </a:lnSpc>
+              <a:spcBef>
+                <a:spcPts val="0"/>
+              </a:spcBef>
+              <a:spcAft>
+                <a:spcPts val="0"/>
+              </a:spcAft>
+              <a:buSzPts val="2400"/>
+              <a:buChar char="-"/>
+            </a:pPr>
+            <a:r>
+              <a:rPr lang="en-GB" sz="2400"/>
+              <a:t>Raised $100 million in Series C funding, and has the current valuation of $1.1 billion.</a:t>
+            </a:r>
+            <a:endParaRPr sz="2400"/>
+          </a:p>
+          <a:p>
+            <a:pPr marL="457200" lvl="0" indent="-381000" algn="l" rtl="0">
+              <a:lnSpc>
+                <a:spcPct val="100000"/>
+              </a:lnSpc>
+              <a:spcBef>
+                <a:spcPts val="0"/>
+              </a:spcBef>
+              <a:spcAft>
+                <a:spcPts val="0"/>
+              </a:spcAft>
+              <a:buSzPts val="2400"/>
+              <a:buChar char="-"/>
+            </a:pPr>
+            <a:r>
+              <a:rPr lang="en-GB" sz="2400"/>
+              <a:t>It was started by Nirmit Parikh in 2019.</a:t>
+            </a:r>
+            <a:endParaRPr sz="2400"/>
+          </a:p>
+          <a:p>
+            <a:pPr marL="457200" lvl="0" indent="-381000" algn="l" rtl="0">
+              <a:lnSpc>
+                <a:spcPct val="100000"/>
+              </a:lnSpc>
+              <a:spcBef>
+                <a:spcPts val="0"/>
+              </a:spcBef>
+              <a:spcAft>
+                <a:spcPts val="0"/>
+              </a:spcAft>
+              <a:buSzPts val="2400"/>
+              <a:buChar char="-"/>
+            </a:pPr>
+            <a:r>
+              <a:rPr lang="en-GB" sz="2400"/>
+              <a:t>The jobs platform claims to have facilitated over 100 million interviews over the past 15 months.</a:t>
+            </a:r>
+            <a:endParaRPr lang="en-GB" sz="2400"/>
+          </a:p>
+        </p:txBody>
+      </p:sp>
     </p:spTree>
   </p:cSld>
   <p:clrMapOvr>
@@ -6110,7 +5744,7 @@
         </p:nvSpPr>
         <p:spPr>
           <a:xfrm>
-            <a:off x="311700" y="445025"/>
+            <a:off x="53700" y="453350"/>
             <a:ext cx="8520600" cy="572700"/>
           </a:xfrm>
           <a:prstGeom prst="rect">
@@ -6124,46 +5758,19 @@
           <a:lstStyle/>
           <a:p>
             <a:pPr marL="0" lvl="0" indent="0" algn="l" rtl="0">
-              <a:lnSpc>
-                <a:spcPct val="115000"/>
-              </a:lnSpc>
-              <a:spcBef>
-                <a:spcPts val="1200"/>
-              </a:spcBef>
-              <a:spcAft>
-                <a:spcPts val="0"/>
-              </a:spcAft>
-              <a:buClr>
-                <a:schemeClr val="dk1"/>
-              </a:buClr>
-              <a:buSzPct val="42000"/>
-              <a:buFont typeface="Arial" panose="020B0704020202020204"/>
+              <a:spcBef>
+                <a:spcPts val="0"/>
+              </a:spcBef>
+              <a:spcAft>
+                <a:spcPts val="0"/>
+              </a:spcAft>
               <a:buNone/>
             </a:pPr>
             <a:r>
-              <a:rPr lang="en-GB" sz="2600" b="1">
-                <a:highlight>
-                  <a:srgbClr val="FAF9F8"/>
-                </a:highlight>
-              </a:rPr>
-              <a:t>Introduction</a:t>
+              <a:rPr lang="en-GB"/>
+              <a:t>Nirmit Parikh</a:t>
             </a:r>
-            <a:endParaRPr sz="2600" b="1">
-              <a:highlight>
-                <a:srgbClr val="FAF9F8"/>
-              </a:highlight>
-            </a:endParaRPr>
-          </a:p>
-          <a:p>
-            <a:pPr marL="0" lvl="0" indent="0" algn="l" rtl="0">
-              <a:spcBef>
-                <a:spcPts val="1200"/>
-              </a:spcBef>
-              <a:spcAft>
-                <a:spcPts val="0"/>
-              </a:spcAft>
-              <a:buNone/>
-            </a:pPr>
+            <a:endParaRPr lang="en-GB"/>
           </a:p>
         </p:txBody>
       </p:sp>
@@ -6178,160 +5785,169 @@
         <p:spPr>
           <a:xfrm>
             <a:off x="311700" y="1152475"/>
-            <a:ext cx="8520600" cy="3697800"/>
+            <a:ext cx="8520600" cy="3416400"/>
           </a:xfrm>
           <a:prstGeom prst="rect">
             <a:avLst/>
           </a:prstGeom>
         </p:spPr>
         <p:txBody>
-          <a:bodyPr spcFirstLastPara="1" wrap="square" lIns="91425" tIns="91425" rIns="91425" bIns="91425" anchor="ctr" anchorCtr="0">
+          <a:bodyPr spcFirstLastPara="1" wrap="square" lIns="91425" tIns="91425" rIns="91425" bIns="91425" anchor="t" anchorCtr="0">
             <a:normAutofit/>
           </a:bodyPr>
           <a:lstStyle/>
           <a:p>
-            <a:pPr marL="0" lvl="0" indent="0" algn="just" rtl="0">
+            <a:pPr marL="457200" lvl="0" indent="-328295" algn="l" rtl="0">
               <a:lnSpc>
-                <a:spcPct val="150000"/>
+                <a:spcPct val="105000"/>
               </a:lnSpc>
               <a:spcBef>
-                <a:spcPts val="1200"/>
-              </a:spcBef>
-              <a:spcAft>
-                <a:spcPts val="0"/>
-              </a:spcAft>
-              <a:buClr>
-                <a:schemeClr val="dk1"/>
-              </a:buClr>
-              <a:buSzPts val="1100"/>
-              <a:buFont typeface="Arial" panose="020B0704020202020204"/>
-              <a:buNone/>
+                <a:spcPts val="0"/>
+              </a:spcBef>
+              <a:spcAft>
+                <a:spcPts val="0"/>
+              </a:spcAft>
+              <a:buSzPts val="1571"/>
+              <a:buChar char="-"/>
             </a:pPr>
             <a:r>
-              <a:rPr lang="en-GB" sz="1600">
-                <a:solidFill>
-                  <a:srgbClr val="3B3835"/>
-                </a:solidFill>
-                <a:highlight>
-                  <a:schemeClr val="lt1"/>
-                </a:highlight>
-              </a:rPr>
-              <a:t>Blogging has become such a mania that a new blog is being created every second of every minute of every hour. A blog is your best bet for a voice among the online crowd.</a:t>
+              <a:rPr lang="en-GB" sz="1570"/>
+              <a:t>Founder of Incone(2009), Cruxbot(2012), and Apna(2019).</a:t>
             </a:r>
-            <a:endParaRPr sz="1600">
-              <a:solidFill>
-                <a:srgbClr val="3B3835"/>
-              </a:solidFill>
-              <a:highlight>
-                <a:schemeClr val="lt1"/>
-              </a:highlight>
-            </a:endParaRPr>
+            <a:br>
+              <a:rPr lang="en-GB" sz="1570"/>
+            </a:br>
+            <a:endParaRPr sz="1570"/>
           </a:p>
           <a:p>
-            <a:pPr marL="0" lvl="0" indent="0" algn="just" rtl="0">
+            <a:pPr marL="457200" lvl="0" indent="-328295" algn="l" rtl="0">
               <a:lnSpc>
-                <a:spcPct val="150000"/>
+                <a:spcPct val="105000"/>
               </a:lnSpc>
               <a:spcBef>
-                <a:spcPts val="1200"/>
-              </a:spcBef>
-              <a:spcAft>
-                <a:spcPts val="0"/>
-              </a:spcAft>
-              <a:buClr>
-                <a:schemeClr val="dk1"/>
-              </a:buClr>
-              <a:buSzPts val="1100"/>
-              <a:buFont typeface="Arial" panose="020B0704020202020204"/>
-              <a:buNone/>
+                <a:spcPts val="0"/>
+              </a:spcBef>
+              <a:spcAft>
+                <a:spcPts val="0"/>
+              </a:spcAft>
+              <a:buSzPts val="1571"/>
+              <a:buChar char="-"/>
             </a:pPr>
             <a:r>
-              <a:rPr lang="en-GB" sz="1600">
-                <a:solidFill>
-                  <a:srgbClr val="3B3835"/>
-                </a:solidFill>
-                <a:highlight>
-                  <a:schemeClr val="lt1"/>
-                </a:highlight>
-              </a:rPr>
-              <a:t>Thus, we have created a website that allows users to create their own blogs and upload them for anyone and everyone to see.</a:t>
+              <a:rPr lang="en-GB" sz="1570"/>
+              <a:t>He then worked as Intel’s director of data </a:t>
             </a:r>
-            <a:endParaRPr sz="1600">
-              <a:solidFill>
-                <a:srgbClr val="3B3835"/>
-              </a:solidFill>
-              <a:highlight>
-                <a:schemeClr val="lt1"/>
-              </a:highlight>
-            </a:endParaRPr>
+            <a:br>
+              <a:rPr lang="en-GB" sz="1570"/>
+            </a:br>
+            <a:r>
+              <a:rPr lang="en-GB" sz="1570"/>
+              <a:t>Analytics. Later joined Apple.</a:t>
+            </a:r>
+            <a:br>
+              <a:rPr lang="en-GB" sz="1570"/>
+            </a:br>
+            <a:endParaRPr sz="1570"/>
           </a:p>
           <a:p>
-            <a:pPr marL="0" lvl="0" indent="0" algn="just" rtl="0">
+            <a:pPr marL="457200" lvl="0" indent="-328295" algn="l" rtl="0">
               <a:lnSpc>
-                <a:spcPct val="150000"/>
+                <a:spcPct val="105000"/>
               </a:lnSpc>
               <a:spcBef>
-                <a:spcPts val="1200"/>
-              </a:spcBef>
-              <a:spcAft>
-                <a:spcPts val="0"/>
-              </a:spcAft>
-              <a:buClr>
-                <a:schemeClr val="dk1"/>
-              </a:buClr>
-              <a:buSzPts val="1100"/>
-              <a:buFont typeface="Arial" panose="020B0704020202020204"/>
-              <a:buNone/>
+                <a:spcPts val="0"/>
+              </a:spcBef>
+              <a:spcAft>
+                <a:spcPts val="0"/>
+              </a:spcAft>
+              <a:buSzPts val="1571"/>
+              <a:buChar char="-"/>
             </a:pPr>
-            <a:endParaRPr sz="1600">
-              <a:solidFill>
-                <a:srgbClr val="3B3835"/>
-              </a:solidFill>
-              <a:highlight>
-                <a:schemeClr val="lt1"/>
-              </a:highlight>
-            </a:endParaRPr>
+            <a:r>
+              <a:rPr lang="en-GB" sz="1570"/>
+              <a:t>Described as a problem-solver. He left his</a:t>
+            </a:r>
+            <a:br>
+              <a:rPr lang="en-GB" sz="1570"/>
+            </a:br>
+            <a:r>
+              <a:rPr lang="en-GB" sz="1570"/>
+              <a:t>job at apple and came back to form Apna.</a:t>
+            </a:r>
+            <a:br>
+              <a:rPr lang="en-GB" sz="1570"/>
+            </a:br>
+            <a:endParaRPr sz="1570"/>
           </a:p>
           <a:p>
-            <a:pPr marL="0" lvl="0" indent="0" algn="just" rtl="0">
+            <a:pPr marL="457200" lvl="0" indent="-328295" algn="l" rtl="0">
               <a:lnSpc>
-                <a:spcPct val="200000"/>
+                <a:spcPct val="105000"/>
               </a:lnSpc>
               <a:spcBef>
-                <a:spcPts val="1200"/>
-              </a:spcBef>
-              <a:spcAft>
-                <a:spcPts val="0"/>
-              </a:spcAft>
-              <a:buClr>
-                <a:schemeClr val="dk1"/>
-              </a:buClr>
-              <a:buSzPts val="1100"/>
-              <a:buFont typeface="Arial" panose="020B0704020202020204"/>
-              <a:buNone/>
+                <a:spcPts val="0"/>
+              </a:spcBef>
+              <a:spcAft>
+                <a:spcPts val="0"/>
+              </a:spcAft>
+              <a:buSzPts val="1571"/>
+              <a:buChar char="-"/>
             </a:pPr>
-            <a:endParaRPr sz="1600">
-              <a:solidFill>
-                <a:srgbClr val="3B3835"/>
-              </a:solidFill>
-              <a:highlight>
-                <a:srgbClr val="FFFFFF"/>
-              </a:highlight>
-            </a:endParaRPr>
-          </a:p>
-          <a:p>
-            <a:pPr marL="0" lvl="0" indent="0" algn="l" rtl="0">
-              <a:spcBef>
-                <a:spcPts val="1200"/>
-              </a:spcBef>
-              <a:spcAft>
-                <a:spcPts val="1200"/>
-              </a:spcAft>
-              <a:buNone/>
-            </a:pPr>
+            <a:r>
+              <a:rPr lang="en-GB" sz="1570"/>
+              <a:t>While trying to understand the problem of </a:t>
+            </a:r>
+            <a:br>
+              <a:rPr lang="en-GB" sz="1570"/>
+            </a:br>
+            <a:r>
+              <a:rPr lang="en-GB" sz="1570"/>
+              <a:t>Hiring completely, Nirmit also went and </a:t>
+            </a:r>
+            <a:br>
+              <a:rPr lang="en-GB" sz="1570"/>
+            </a:br>
+            <a:r>
+              <a:rPr lang="en-GB" sz="1570"/>
+              <a:t>worked as a blue collar worker himself in order</a:t>
+            </a:r>
+            <a:br>
+              <a:rPr lang="en-GB" sz="1570"/>
+            </a:br>
+            <a:r>
+              <a:rPr lang="en-GB" sz="1570"/>
+              <a:t>to better understand their goals and struggles.</a:t>
+            </a:r>
+            <a:endParaRPr sz="625"/>
           </a:p>
         </p:txBody>
       </p:sp>
+      <p:pic>
+        <p:nvPicPr>
+          <p:cNvPr id="62" name="Google Shape;62;p14" descr="Hero image"/>
+          <p:cNvPicPr preferRelativeResize="0"/>
+          <p:nvPr/>
+        </p:nvPicPr>
+        <p:blipFill>
+          <a:blip r:embed="rId1"/>
+          <a:stretch>
+            <a:fillRect/>
+          </a:stretch>
+        </p:blipFill>
+        <p:spPr>
+          <a:xfrm>
+            <a:off x="5268525" y="1794350"/>
+            <a:ext cx="3563774" cy="2132650"/>
+          </a:xfrm>
+          <a:prstGeom prst="rect">
+            <a:avLst/>
+          </a:prstGeom>
+          <a:noFill/>
+          <a:ln>
+            <a:noFill/>
+          </a:ln>
+        </p:spPr>
+      </p:pic>
     </p:spTree>
   </p:cSld>
   <p:clrMapOvr>

</xml_diff>